<commit_message>
did stuff my dudes
</commit_message>
<xml_diff>
--- a/presentation.pptx
+++ b/presentation.pptx
@@ -289,6 +289,7 @@
           <a:p>
             <a:fld id="{F79022E3-56D2-4432-AF26-E3B5522124ED}" type="datetimeFigureOut">
               <a:rPr lang="en-US" smtClean="0"/>
+              <a:pPr/>
               <a:t>12/7/2015</a:t>
             </a:fld>
             <a:endParaRPr lang="en-US"/>
@@ -331,6 +332,7 @@
           <a:p>
             <a:fld id="{676B7A41-54DA-4B93-9D46-963CCAFB0277}" type="slidenum">
               <a:rPr lang="en-US" smtClean="0"/>
+              <a:pPr/>
               <a:t>‹#›</a:t>
             </a:fld>
             <a:endParaRPr lang="en-US"/>
@@ -454,6 +456,7 @@
           <a:p>
             <a:fld id="{F79022E3-56D2-4432-AF26-E3B5522124ED}" type="datetimeFigureOut">
               <a:rPr lang="en-US" smtClean="0"/>
+              <a:pPr/>
               <a:t>12/7/2015</a:t>
             </a:fld>
             <a:endParaRPr lang="en-US"/>
@@ -496,6 +499,7 @@
           <a:p>
             <a:fld id="{676B7A41-54DA-4B93-9D46-963CCAFB0277}" type="slidenum">
               <a:rPr lang="en-US" smtClean="0"/>
+              <a:pPr/>
               <a:t>‹#›</a:t>
             </a:fld>
             <a:endParaRPr lang="en-US"/>
@@ -629,6 +633,7 @@
           <a:p>
             <a:fld id="{F79022E3-56D2-4432-AF26-E3B5522124ED}" type="datetimeFigureOut">
               <a:rPr lang="en-US" smtClean="0"/>
+              <a:pPr/>
               <a:t>12/7/2015</a:t>
             </a:fld>
             <a:endParaRPr lang="en-US"/>
@@ -671,6 +676,7 @@
           <a:p>
             <a:fld id="{676B7A41-54DA-4B93-9D46-963CCAFB0277}" type="slidenum">
               <a:rPr lang="en-US" smtClean="0"/>
+              <a:pPr/>
               <a:t>‹#›</a:t>
             </a:fld>
             <a:endParaRPr lang="en-US"/>
@@ -794,6 +800,7 @@
           <a:p>
             <a:fld id="{F79022E3-56D2-4432-AF26-E3B5522124ED}" type="datetimeFigureOut">
               <a:rPr lang="en-US" smtClean="0"/>
+              <a:pPr/>
               <a:t>12/7/2015</a:t>
             </a:fld>
             <a:endParaRPr lang="en-US"/>
@@ -836,6 +843,7 @@
           <a:p>
             <a:fld id="{676B7A41-54DA-4B93-9D46-963CCAFB0277}" type="slidenum">
               <a:rPr lang="en-US" smtClean="0"/>
+              <a:pPr/>
               <a:t>‹#›</a:t>
             </a:fld>
             <a:endParaRPr lang="en-US"/>
@@ -1035,6 +1043,7 @@
           <a:p>
             <a:fld id="{F79022E3-56D2-4432-AF26-E3B5522124ED}" type="datetimeFigureOut">
               <a:rPr lang="en-US" smtClean="0"/>
+              <a:pPr/>
               <a:t>12/7/2015</a:t>
             </a:fld>
             <a:endParaRPr lang="en-US"/>
@@ -1077,6 +1086,7 @@
           <a:p>
             <a:fld id="{676B7A41-54DA-4B93-9D46-963CCAFB0277}" type="slidenum">
               <a:rPr lang="en-US" smtClean="0"/>
+              <a:pPr/>
               <a:t>‹#›</a:t>
             </a:fld>
             <a:endParaRPr lang="en-US"/>
@@ -1318,6 +1328,7 @@
           <a:p>
             <a:fld id="{F79022E3-56D2-4432-AF26-E3B5522124ED}" type="datetimeFigureOut">
               <a:rPr lang="en-US" smtClean="0"/>
+              <a:pPr/>
               <a:t>12/7/2015</a:t>
             </a:fld>
             <a:endParaRPr lang="en-US"/>
@@ -1360,6 +1371,7 @@
           <a:p>
             <a:fld id="{676B7A41-54DA-4B93-9D46-963CCAFB0277}" type="slidenum">
               <a:rPr lang="en-US" smtClean="0"/>
+              <a:pPr/>
               <a:t>‹#›</a:t>
             </a:fld>
             <a:endParaRPr lang="en-US"/>
@@ -1735,6 +1747,7 @@
           <a:p>
             <a:fld id="{F79022E3-56D2-4432-AF26-E3B5522124ED}" type="datetimeFigureOut">
               <a:rPr lang="en-US" smtClean="0"/>
+              <a:pPr/>
               <a:t>12/7/2015</a:t>
             </a:fld>
             <a:endParaRPr lang="en-US"/>
@@ -1777,6 +1790,7 @@
           <a:p>
             <a:fld id="{676B7A41-54DA-4B93-9D46-963CCAFB0277}" type="slidenum">
               <a:rPr lang="en-US" smtClean="0"/>
+              <a:pPr/>
               <a:t>‹#›</a:t>
             </a:fld>
             <a:endParaRPr lang="en-US"/>
@@ -1848,6 +1862,7 @@
           <a:p>
             <a:fld id="{F79022E3-56D2-4432-AF26-E3B5522124ED}" type="datetimeFigureOut">
               <a:rPr lang="en-US" smtClean="0"/>
+              <a:pPr/>
               <a:t>12/7/2015</a:t>
             </a:fld>
             <a:endParaRPr lang="en-US"/>
@@ -1890,6 +1905,7 @@
           <a:p>
             <a:fld id="{676B7A41-54DA-4B93-9D46-963CCAFB0277}" type="slidenum">
               <a:rPr lang="en-US" smtClean="0"/>
+              <a:pPr/>
               <a:t>‹#›</a:t>
             </a:fld>
             <a:endParaRPr lang="en-US"/>
@@ -1938,6 +1954,7 @@
           <a:p>
             <a:fld id="{F79022E3-56D2-4432-AF26-E3B5522124ED}" type="datetimeFigureOut">
               <a:rPr lang="en-US" smtClean="0"/>
+              <a:pPr/>
               <a:t>12/7/2015</a:t>
             </a:fld>
             <a:endParaRPr lang="en-US"/>
@@ -1980,6 +1997,7 @@
           <a:p>
             <a:fld id="{676B7A41-54DA-4B93-9D46-963CCAFB0277}" type="slidenum">
               <a:rPr lang="en-US" smtClean="0"/>
+              <a:pPr/>
               <a:t>‹#›</a:t>
             </a:fld>
             <a:endParaRPr lang="en-US"/>
@@ -2210,6 +2228,7 @@
           <a:p>
             <a:fld id="{F79022E3-56D2-4432-AF26-E3B5522124ED}" type="datetimeFigureOut">
               <a:rPr lang="en-US" smtClean="0"/>
+              <a:pPr/>
               <a:t>12/7/2015</a:t>
             </a:fld>
             <a:endParaRPr lang="en-US"/>
@@ -2252,6 +2271,7 @@
           <a:p>
             <a:fld id="{676B7A41-54DA-4B93-9D46-963CCAFB0277}" type="slidenum">
               <a:rPr lang="en-US" smtClean="0"/>
+              <a:pPr/>
               <a:t>‹#›</a:t>
             </a:fld>
             <a:endParaRPr lang="en-US"/>
@@ -2458,6 +2478,7 @@
           <a:p>
             <a:fld id="{F79022E3-56D2-4432-AF26-E3B5522124ED}" type="datetimeFigureOut">
               <a:rPr lang="en-US" smtClean="0"/>
+              <a:pPr/>
               <a:t>12/7/2015</a:t>
             </a:fld>
             <a:endParaRPr lang="en-US"/>
@@ -2500,6 +2521,7 @@
           <a:p>
             <a:fld id="{676B7A41-54DA-4B93-9D46-963CCAFB0277}" type="slidenum">
               <a:rPr lang="en-US" smtClean="0"/>
+              <a:pPr/>
               <a:t>‹#›</a:t>
             </a:fld>
             <a:endParaRPr lang="en-US"/>
@@ -2666,6 +2688,7 @@
           <a:p>
             <a:fld id="{F79022E3-56D2-4432-AF26-E3B5522124ED}" type="datetimeFigureOut">
               <a:rPr lang="en-US" smtClean="0"/>
+              <a:pPr/>
               <a:t>12/7/2015</a:t>
             </a:fld>
             <a:endParaRPr lang="en-US"/>
@@ -2744,6 +2767,7 @@
           <a:p>
             <a:fld id="{676B7A41-54DA-4B93-9D46-963CCAFB0277}" type="slidenum">
               <a:rPr lang="en-US" smtClean="0"/>
+              <a:pPr/>
               <a:t>‹#›</a:t>
             </a:fld>
             <a:endParaRPr lang="en-US"/>
@@ -3159,10 +3183,38 @@
           <a:bodyPr/>
           <a:lstStyle/>
           <a:p>
-            <a:endParaRPr lang="en-US"/>
-          </a:p>
-        </p:txBody>
-      </p:sp>
+            <a:r>
+              <a:rPr lang="en-US" dirty="0" smtClean="0"/>
+              <a:t>Obama quote: </a:t>
+            </a:r>
+            <a:endParaRPr lang="en-US" dirty="0"/>
+          </a:p>
+        </p:txBody>
+      </p:sp>
+      <p:pic>
+        <p:nvPicPr>
+          <p:cNvPr id="4" name="Picture 3" descr="12193373_10208030215702115_5196173771417198970_n.jpg"/>
+          <p:cNvPicPr>
+            <a:picLocks noChangeAspect="1"/>
+          </p:cNvPicPr>
+          <p:nvPr/>
+        </p:nvPicPr>
+        <p:blipFill>
+          <a:blip r:embed="rId2" cstate="print"/>
+          <a:stretch>
+            <a:fillRect/>
+          </a:stretch>
+        </p:blipFill>
+        <p:spPr>
+          <a:xfrm>
+            <a:off x="3733800" y="1600200"/>
+            <a:ext cx="4974770" cy="4948238"/>
+          </a:xfrm>
+          <a:prstGeom prst="rect">
+            <a:avLst/>
+          </a:prstGeom>
+        </p:spPr>
+      </p:pic>
     </p:spTree>
   </p:cSld>
   <p:clrMapOvr>

</xml_diff>